<commit_message>
A few more edits
</commit_message>
<xml_diff>
--- a/New Release of SolrMarc.pptx
+++ b/New Release of SolrMarc.pptx
@@ -214,7 +214,7 @@
           <a:p>
             <a:fld id="{3B0E7819-CD1E-4708-9554-34F22524524B}" type="datetimeFigureOut">
               <a:rPr lang="en-US" smtClean="0"/>
-              <a:t>10/6/2016</a:t>
+              <a:t>10/7/2016</a:t>
             </a:fld>
             <a:endParaRPr lang="en-US"/>
           </a:p>
@@ -538,24 +538,22 @@
             </a:r>
             <a:r>
               <a:rPr lang="en-US" baseline="0" dirty="0" smtClean="0"/>
-              <a:t> </a:t>
+              <a:t> Graham then of </a:t>
             </a:r>
             <a:r>
               <a:rPr lang="en-US" baseline="0" dirty="0" smtClean="0"/>
-              <a:t>Graham then of William and Mary,   </a:t>
-            </a:r>
-            <a:endParaRPr lang="en-US" baseline="0" dirty="0" smtClean="0"/>
-          </a:p>
-          <a:p>
+              <a:t>College of William </a:t>
+            </a:r>
             <a:r>
               <a:rPr lang="en-US" baseline="0" dirty="0" smtClean="0"/>
-              <a:t>Andrew </a:t>
-            </a:r>
+              <a:t>and Mary,   </a:t>
+            </a:r>
+          </a:p>
+          <a:p>
             <a:r>
               <a:rPr lang="en-US" baseline="0" dirty="0" smtClean="0"/>
-              <a:t>Nagy then from this fine Institution, </a:t>
-            </a:r>
-            <a:endParaRPr lang="en-US" baseline="0" dirty="0" smtClean="0"/>
+              <a:t>Andrew Nagy then from this fine Institution, </a:t>
+            </a:r>
           </a:p>
           <a:p>
             <a:r>
@@ -570,17 +568,69 @@
               <a:rPr lang="en-US" baseline="0" dirty="0" smtClean="0"/>
               <a:t> from Stanford University, </a:t>
             </a:r>
+          </a:p>
+          <a:p>
+            <a:r>
+              <a:rPr lang="en-US" baseline="0" dirty="0" smtClean="0"/>
+              <a:t>Me from the University of </a:t>
+            </a:r>
+            <a:r>
+              <a:rPr lang="en-US" baseline="0" dirty="0" smtClean="0"/>
+              <a:t>Virginia</a:t>
+            </a:r>
+          </a:p>
+          <a:p>
             <a:endParaRPr lang="en-US" baseline="0" dirty="0" smtClean="0"/>
           </a:p>
           <a:p>
+            <a:pPr marL="0" marR="0" indent="0" algn="l" defTabSz="914400" rtl="0" eaLnBrk="1" fontAlgn="auto" latinLnBrk="0" hangingPunct="1">
+              <a:lnSpc>
+                <a:spcPct val="100000"/>
+              </a:lnSpc>
+              <a:spcBef>
+                <a:spcPts val="0"/>
+              </a:spcBef>
+              <a:spcAft>
+                <a:spcPts val="0"/>
+              </a:spcAft>
+              <a:buClrTx/>
+              <a:buSzTx/>
+              <a:buFontTx/>
+              <a:buNone/>
+              <a:tabLst/>
+              <a:defRPr/>
+            </a:pPr>
             <a:r>
               <a:rPr lang="en-US" baseline="0" dirty="0" smtClean="0"/>
-              <a:t>Me </a:t>
-            </a:r>
-            <a:r>
-              <a:rPr lang="en-US" baseline="0" dirty="0" smtClean="0"/>
-              <a:t>from the University of Virginia</a:t>
-            </a:r>
+              <a:t>It was </a:t>
+            </a:r>
+            <a:r>
+              <a:rPr lang="en-US" dirty="0" smtClean="0"/>
+              <a:t>designed from the beginning to build </a:t>
+            </a:r>
+            <a:r>
+              <a:rPr lang="en-US" dirty="0" err="1" smtClean="0"/>
+              <a:t>Solr</a:t>
+            </a:r>
+            <a:r>
+              <a:rPr lang="en-US" dirty="0" smtClean="0"/>
+              <a:t> indexes for both </a:t>
+            </a:r>
+            <a:r>
+              <a:rPr lang="en-US" dirty="0" err="1" smtClean="0"/>
+              <a:t>VuFind</a:t>
+            </a:r>
+            <a:r>
+              <a:rPr lang="en-US" dirty="0" smtClean="0"/>
+              <a:t> and </a:t>
+            </a:r>
+            <a:r>
+              <a:rPr lang="en-US" dirty="0" err="1" smtClean="0"/>
+              <a:t>Blacklight</a:t>
+            </a:r>
+            <a:endParaRPr lang="en-US" dirty="0" smtClean="0"/>
+          </a:p>
+          <a:p>
             <a:endParaRPr lang="en-US" dirty="0"/>
           </a:p>
         </p:txBody>
@@ -776,7 +826,15 @@
             </a:r>
             <a:r>
               <a:rPr lang="en-US" baseline="0" dirty="0" smtClean="0"/>
-              <a:t> Specification language  there still will be situations where what you need to do is more complex than what you can do with a “simple index spec”  </a:t>
+              <a:t> Specification language  there still will be situations where what you need to do is </a:t>
+            </a:r>
+            <a:r>
+              <a:rPr lang="en-US" baseline="0" dirty="0" smtClean="0"/>
+              <a:t>too complex for a </a:t>
+            </a:r>
+            <a:r>
+              <a:rPr lang="en-US" baseline="0" dirty="0" smtClean="0"/>
+              <a:t>“simple index spec”  </a:t>
             </a:r>
           </a:p>
           <a:p>
@@ -827,6 +885,22 @@
             <a:r>
               <a:rPr lang="en-US" dirty="0" err="1" smtClean="0"/>
               <a:t>SolrIndexer</a:t>
+            </a:r>
+            <a:r>
+              <a:rPr lang="en-US" dirty="0" smtClean="0"/>
+              <a:t> such as those</a:t>
+            </a:r>
+            <a:r>
+              <a:rPr lang="en-US" baseline="0" dirty="0" smtClean="0"/>
+              <a:t> in </a:t>
+            </a:r>
+            <a:r>
+              <a:rPr lang="en-US" baseline="0" dirty="0" err="1" smtClean="0"/>
+              <a:t>VuFindIndexer</a:t>
+            </a:r>
+            <a:r>
+              <a:rPr lang="en-US" baseline="0" dirty="0" smtClean="0"/>
+              <a:t> class</a:t>
             </a:r>
             <a:endParaRPr lang="en-US" dirty="0" smtClean="0"/>
           </a:p>
@@ -1013,8 +1087,85 @@
             </a:r>
             <a:r>
               <a:rPr lang="en-US" baseline="0" dirty="0" smtClean="0"/>
-              <a:t> came up with new alternative to all of those -- Dynamically Compiled Java Code</a:t>
-            </a:r>
+              <a:t> came up with new alternative to all of those </a:t>
+            </a:r>
+            <a:r>
+              <a:rPr lang="en-US" baseline="0" dirty="0" smtClean="0"/>
+              <a:t>– Dynamically </a:t>
+            </a:r>
+            <a:r>
+              <a:rPr lang="en-US" baseline="0" dirty="0" smtClean="0"/>
+              <a:t>Compiled Java </a:t>
+            </a:r>
+            <a:r>
+              <a:rPr lang="en-US" baseline="0" dirty="0" smtClean="0"/>
+              <a:t>Code</a:t>
+            </a:r>
+          </a:p>
+          <a:p>
+            <a:endParaRPr lang="en-US" dirty="0" smtClean="0"/>
+          </a:p>
+          <a:p>
+            <a:r>
+              <a:rPr lang="en-US" dirty="0" smtClean="0"/>
+              <a:t>Place java source file in a specific directory</a:t>
+            </a:r>
+          </a:p>
+          <a:p>
+            <a:r>
+              <a:rPr lang="en-US" dirty="0" smtClean="0"/>
+              <a:t>Reference a method in an index specification</a:t>
+            </a:r>
+          </a:p>
+          <a:p>
+            <a:r>
+              <a:rPr lang="en-US" dirty="0" smtClean="0"/>
+              <a:t>Run </a:t>
+            </a:r>
+            <a:r>
+              <a:rPr lang="en-US" dirty="0" err="1" smtClean="0"/>
+              <a:t>SolrMarc</a:t>
+            </a:r>
+            <a:endParaRPr lang="en-US" dirty="0" smtClean="0"/>
+          </a:p>
+          <a:p>
+            <a:endParaRPr lang="en-US" dirty="0" smtClean="0"/>
+          </a:p>
+          <a:p>
+            <a:r>
+              <a:rPr lang="en-US" dirty="0" smtClean="0"/>
+              <a:t>As easy as using </a:t>
+            </a:r>
+            <a:r>
+              <a:rPr lang="en-US" dirty="0" err="1" smtClean="0"/>
+              <a:t>Beanshell</a:t>
+            </a:r>
+            <a:r>
+              <a:rPr lang="en-US" dirty="0" smtClean="0"/>
+              <a:t> scripts.</a:t>
+            </a:r>
+          </a:p>
+          <a:p>
+            <a:r>
+              <a:rPr lang="en-US" dirty="0" smtClean="0"/>
+              <a:t>Uses actual Java syntax.</a:t>
+            </a:r>
+          </a:p>
+          <a:p>
+            <a:r>
+              <a:rPr lang="en-US" dirty="0" smtClean="0"/>
+              <a:t>So its</a:t>
+            </a:r>
+            <a:r>
+              <a:rPr lang="en-US" baseline="0" dirty="0" smtClean="0"/>
+              <a:t> a</a:t>
+            </a:r>
+            <a:r>
+              <a:rPr lang="en-US" dirty="0" smtClean="0"/>
+              <a:t>s fast as any other compiled Java code</a:t>
+            </a:r>
+          </a:p>
+          <a:p>
             <a:endParaRPr lang="en-US" dirty="0"/>
           </a:p>
         </p:txBody>
@@ -1289,11 +1440,15 @@
           <a:p>
             <a:r>
               <a:rPr lang="en-US" dirty="0" smtClean="0"/>
-              <a:t>Further more</a:t>
+              <a:t>Furthermore</a:t>
             </a:r>
             <a:r>
               <a:rPr lang="en-US" baseline="0" dirty="0" smtClean="0"/>
-              <a:t> since the program c</a:t>
+              <a:t> </a:t>
+            </a:r>
+            <a:r>
+              <a:rPr lang="en-US" baseline="0" dirty="0" smtClean="0"/>
+              <a:t>since the program c</a:t>
             </a:r>
             <a:r>
               <a:rPr lang="en-US" dirty="0" smtClean="0"/>
@@ -1350,7 +1505,23 @@
             </a:r>
             <a:r>
               <a:rPr lang="en-US" dirty="0" smtClean="0"/>
-              <a:t> required a release and perhaps significant new code.</a:t>
+              <a:t> </a:t>
+            </a:r>
+            <a:r>
+              <a:rPr lang="en-US" dirty="0" smtClean="0"/>
+              <a:t> required </a:t>
+            </a:r>
+            <a:r>
+              <a:rPr lang="en-US" dirty="0" smtClean="0"/>
+              <a:t>a release and perhaps </a:t>
+            </a:r>
+            <a:r>
+              <a:rPr lang="en-US" dirty="0" smtClean="0"/>
+              <a:t>required significant </a:t>
+            </a:r>
+            <a:r>
+              <a:rPr lang="en-US" dirty="0" smtClean="0"/>
+              <a:t>new code.</a:t>
             </a:r>
             <a:endParaRPr lang="en-US" baseline="0" dirty="0" smtClean="0"/>
           </a:p>
@@ -1452,11 +1623,7 @@
             </a:r>
             <a:r>
               <a:rPr lang="en-US" dirty="0" smtClean="0"/>
-              <a:t> c</a:t>
-            </a:r>
-            <a:r>
-              <a:rPr lang="en-US" dirty="0" smtClean="0"/>
-              <a:t>onsists of one </a:t>
+              <a:t> consists of one </a:t>
             </a:r>
             <a:r>
               <a:rPr lang="en-US" dirty="0" err="1" smtClean="0"/>
@@ -1499,7 +1666,15 @@
           <a:p>
             <a:r>
               <a:rPr lang="en-US" dirty="0" smtClean="0"/>
-              <a:t>For using a newer version of </a:t>
+              <a:t>For using </a:t>
+            </a:r>
+            <a:r>
+              <a:rPr lang="en-US" dirty="0" smtClean="0"/>
+              <a:t>it with a </a:t>
+            </a:r>
+            <a:r>
+              <a:rPr lang="en-US" dirty="0" smtClean="0"/>
+              <a:t>newer version of </a:t>
             </a:r>
             <a:r>
               <a:rPr lang="en-US" dirty="0" err="1" smtClean="0"/>
@@ -1507,11 +1682,15 @@
             </a:r>
             <a:r>
               <a:rPr lang="en-US" dirty="0" smtClean="0"/>
-              <a:t>, you simply </a:t>
-            </a:r>
-            <a:r>
-              <a:rPr lang="en-US" dirty="0" smtClean="0"/>
-              <a:t>point it at a directory containing the newer versions of </a:t>
+              <a:t>, you simply point it at a directory containing </a:t>
+            </a:r>
+            <a:r>
+              <a:rPr lang="en-US" dirty="0" smtClean="0"/>
+              <a:t>that </a:t>
+            </a:r>
+            <a:r>
+              <a:rPr lang="en-US" dirty="0" smtClean="0"/>
+              <a:t>newer versions </a:t>
             </a:r>
             <a:r>
               <a:rPr lang="en-US" dirty="0" err="1" smtClean="0"/>
@@ -1519,7 +1698,11 @@
             </a:r>
             <a:r>
               <a:rPr lang="en-US" dirty="0" smtClean="0"/>
-              <a:t> libraries.</a:t>
+              <a:t> </a:t>
+            </a:r>
+            <a:r>
+              <a:rPr lang="en-US" dirty="0" smtClean="0"/>
+              <a:t>libraries.</a:t>
             </a:r>
           </a:p>
           <a:p>
@@ -1563,7 +1746,6 @@
               <a:rPr lang="en-US" dirty="0" smtClean="0"/>
               <a:t>, or any re-compiling.</a:t>
             </a:r>
-            <a:endParaRPr lang="en-US" dirty="0" smtClean="0"/>
           </a:p>
           <a:p>
             <a:endParaRPr lang="en-US" dirty="0"/>
@@ -1678,7 +1860,39 @@
             </a:r>
             <a:r>
               <a:rPr lang="en-US" dirty="0" smtClean="0"/>
-              <a:t>Record reader thread,   Indexer thread,   multiple threads sending records to </a:t>
+              <a:t>one for reading the records,  one for generating</a:t>
+            </a:r>
+            <a:r>
+              <a:rPr lang="en-US" baseline="0" dirty="0" smtClean="0"/>
+              <a:t> the </a:t>
+            </a:r>
+            <a:r>
+              <a:rPr lang="en-US" baseline="0" dirty="0" err="1" smtClean="0"/>
+              <a:t>solr</a:t>
+            </a:r>
+            <a:r>
+              <a:rPr lang="en-US" baseline="0" dirty="0" smtClean="0"/>
+              <a:t> add documents based on the index specification</a:t>
+            </a:r>
+            <a:r>
+              <a:rPr lang="en-US" dirty="0" smtClean="0"/>
+              <a:t>,   </a:t>
+            </a:r>
+            <a:r>
+              <a:rPr lang="en-US" dirty="0" smtClean="0"/>
+              <a:t>multiple threads sending </a:t>
+            </a:r>
+            <a:r>
+              <a:rPr lang="en-US" dirty="0" smtClean="0"/>
+              <a:t>those </a:t>
+            </a:r>
+            <a:r>
+              <a:rPr lang="en-US" dirty="0" err="1" smtClean="0"/>
+              <a:t>solr</a:t>
+            </a:r>
+            <a:r>
+              <a:rPr lang="en-US" dirty="0" smtClean="0"/>
+              <a:t> documents to </a:t>
             </a:r>
             <a:r>
               <a:rPr lang="en-US" dirty="0" err="1" smtClean="0"/>
@@ -1692,7 +1906,7 @@
           <a:p>
             <a:r>
               <a:rPr lang="en-US" dirty="0" smtClean="0"/>
-              <a:t>Plus the</a:t>
+              <a:t>The</a:t>
             </a:r>
             <a:r>
               <a:rPr lang="en-US" baseline="0" dirty="0" smtClean="0"/>
@@ -1704,7 +1918,15 @@
             </a:r>
             <a:r>
               <a:rPr lang="en-US" baseline="0" dirty="0" smtClean="0"/>
-              <a:t> threads gather chunks of records to send at the same time.  </a:t>
+              <a:t> threads </a:t>
+            </a:r>
+            <a:r>
+              <a:rPr lang="en-US" baseline="0" dirty="0" smtClean="0"/>
+              <a:t>achieve a further speed-up by gather </a:t>
+            </a:r>
+            <a:r>
+              <a:rPr lang="en-US" baseline="0" dirty="0" smtClean="0"/>
+              <a:t>chunks of records to send at the same time.  </a:t>
             </a:r>
           </a:p>
           <a:p>
@@ -1713,7 +1935,23 @@
           <a:p>
             <a:r>
               <a:rPr lang="en-US" baseline="0" dirty="0" smtClean="0"/>
-              <a:t>And for additional speedup, if you ensure that your custom indexing methods are “thread safe” you can optionally start multiple indexing threads to make the program that much faster.</a:t>
+              <a:t>And for additional </a:t>
+            </a:r>
+            <a:r>
+              <a:rPr lang="en-US" baseline="0" dirty="0" smtClean="0"/>
+              <a:t>speed-up</a:t>
+            </a:r>
+            <a:r>
+              <a:rPr lang="en-US" baseline="0" dirty="0" smtClean="0"/>
+              <a:t>, if you ensure that your custom indexing methods are “thread safe” you can </a:t>
+            </a:r>
+            <a:r>
+              <a:rPr lang="en-US" baseline="0" dirty="0" smtClean="0"/>
+              <a:t>start </a:t>
+            </a:r>
+            <a:r>
+              <a:rPr lang="en-US" baseline="0" dirty="0" smtClean="0"/>
+              <a:t>multiple indexing threads to make the program that much faster.</a:t>
             </a:r>
             <a:endParaRPr lang="en-US" dirty="0"/>
           </a:p>
@@ -2305,7 +2543,15 @@
           <a:p>
             <a:r>
               <a:rPr lang="en-US" baseline="0" dirty="0" smtClean="0"/>
-              <a:t>And while incremental improvements have been made, like adding support for </a:t>
+              <a:t>And while incremental improvements have been </a:t>
+            </a:r>
+            <a:r>
+              <a:rPr lang="en-US" baseline="0" dirty="0" smtClean="0"/>
+              <a:t>made over the past several years, </a:t>
+            </a:r>
+            <a:r>
+              <a:rPr lang="en-US" baseline="0" dirty="0" smtClean="0"/>
+              <a:t>like adding support for </a:t>
             </a:r>
             <a:r>
               <a:rPr lang="en-US" baseline="0" dirty="0" err="1" smtClean="0"/>
@@ -2324,12 +2570,12 @@
               <a:t> it </a:t>
             </a:r>
             <a:r>
-              <a:rPr lang="en-US" baseline="0" dirty="0" err="1" smtClean="0"/>
-              <a:t>realy</a:t>
-            </a:r>
-            <a:r>
               <a:rPr lang="en-US" baseline="0" dirty="0" smtClean="0"/>
-              <a:t> hasn’t made </a:t>
+              <a:t>really </a:t>
+            </a:r>
+            <a:r>
+              <a:rPr lang="en-US" baseline="0" dirty="0" smtClean="0"/>
+              <a:t>hasn’t made </a:t>
             </a:r>
             <a:r>
               <a:rPr lang="en-US" baseline="0" dirty="0" err="1" smtClean="0"/>
@@ -2365,12 +2611,12 @@
               <a:t>, it has been hard to upgrade and therefore </a:t>
             </a:r>
             <a:r>
-              <a:rPr lang="en-US" baseline="0" dirty="0" err="1" smtClean="0"/>
-              <a:t>ofter</a:t>
-            </a:r>
-            <a:r>
               <a:rPr lang="en-US" baseline="0" dirty="0" smtClean="0"/>
-              <a:t> slow to upgrade, which has made it a roadblock for projects relying on it.</a:t>
+              <a:t>often </a:t>
+            </a:r>
+            <a:r>
+              <a:rPr lang="en-US" baseline="0" dirty="0" smtClean="0"/>
+              <a:t>slow to upgrade, which has made it a roadblock for projects relying on it.</a:t>
             </a:r>
             <a:endParaRPr lang="en-US" dirty="0"/>
           </a:p>
@@ -2713,7 +2959,28 @@
           <a:p>
             <a:r>
               <a:rPr lang="en-US" dirty="0" smtClean="0"/>
-              <a:t>Back in February, before Code4Lib</a:t>
+              <a:t>While I had some ideas on ways that </a:t>
+            </a:r>
+            <a:r>
+              <a:rPr lang="en-US" dirty="0" err="1" smtClean="0"/>
+              <a:t>SolrMarc</a:t>
+            </a:r>
+            <a:r>
+              <a:rPr lang="en-US" baseline="0" dirty="0" smtClean="0"/>
+              <a:t> could be made better they really didn’t go anywhere.</a:t>
+            </a:r>
+          </a:p>
+          <a:p>
+            <a:endParaRPr lang="en-US" dirty="0" smtClean="0"/>
+          </a:p>
+          <a:p>
+            <a:r>
+              <a:rPr lang="en-US" dirty="0" smtClean="0"/>
+              <a:t>But, back </a:t>
+            </a:r>
+            <a:r>
+              <a:rPr lang="en-US" dirty="0" smtClean="0"/>
+              <a:t>in February, before Code4Lib</a:t>
             </a:r>
             <a:r>
               <a:rPr lang="en-US" baseline="0" dirty="0" smtClean="0"/>
@@ -2725,7 +2992,26 @@
             </a:r>
             <a:r>
               <a:rPr lang="en-US" baseline="0" dirty="0" smtClean="0"/>
-              <a:t>, who was working on a </a:t>
+              <a:t>, </a:t>
+            </a:r>
+            <a:r>
+              <a:rPr lang="en-US" baseline="0" dirty="0" smtClean="0"/>
+              <a:t>contacted </a:t>
+            </a:r>
+            <a:r>
+              <a:rPr lang="en-US" baseline="0" dirty="0" err="1" smtClean="0"/>
+              <a:t>Demian</a:t>
+            </a:r>
+            <a:r>
+              <a:rPr lang="en-US" baseline="0" dirty="0" smtClean="0"/>
+              <a:t>, who put Oliver in touch with me.  </a:t>
+            </a:r>
+            <a:endParaRPr lang="en-US" baseline="0" dirty="0" smtClean="0"/>
+          </a:p>
+          <a:p>
+            <a:r>
+              <a:rPr lang="en-US" baseline="0" dirty="0" smtClean="0"/>
+              <a:t>He who was working on a </a:t>
             </a:r>
             <a:r>
               <a:rPr lang="en-US" baseline="0" dirty="0" err="1" smtClean="0"/>
@@ -2733,24 +3019,21 @@
             </a:r>
             <a:r>
               <a:rPr lang="en-US" baseline="0" dirty="0" smtClean="0"/>
-              <a:t>-based project for a German Library contacted </a:t>
-            </a:r>
-            <a:r>
-              <a:rPr lang="en-US" baseline="0" dirty="0" err="1" smtClean="0"/>
-              <a:t>Demian</a:t>
-            </a:r>
+              <a:t>-based project for a German Library  </a:t>
+            </a:r>
+            <a:endParaRPr lang="en-US" baseline="0" dirty="0" smtClean="0"/>
+          </a:p>
+          <a:p>
+            <a:endParaRPr lang="en-US" baseline="0" dirty="0" smtClean="0"/>
+          </a:p>
+          <a:p>
             <a:r>
               <a:rPr lang="en-US" baseline="0" dirty="0" smtClean="0"/>
-              <a:t>, who put Oliver in touch with me.   </a:t>
-            </a:r>
-          </a:p>
-          <a:p>
-            <a:endParaRPr lang="en-US" baseline="0" dirty="0" smtClean="0"/>
-          </a:p>
-          <a:p>
+              <a:t>And not </a:t>
+            </a:r>
             <a:r>
               <a:rPr lang="en-US" baseline="0" dirty="0" smtClean="0"/>
-              <a:t>He not only had interest in a new version, he had some specific ideas about how to make </a:t>
+              <a:t>only had interest in a new version, he had some specific ideas about how to make </a:t>
             </a:r>
             <a:r>
               <a:rPr lang="en-US" baseline="0" dirty="0" err="1" smtClean="0"/>
@@ -2758,7 +3041,15 @@
             </a:r>
             <a:r>
               <a:rPr lang="en-US" baseline="0" dirty="0" smtClean="0"/>
-              <a:t> easier to use and faster.</a:t>
+              <a:t> </a:t>
+            </a:r>
+            <a:r>
+              <a:rPr lang="en-US" baseline="0" dirty="0" smtClean="0"/>
+              <a:t>easier to </a:t>
+            </a:r>
+            <a:r>
+              <a:rPr lang="en-US" baseline="0" dirty="0" smtClean="0"/>
+              <a:t>use and faster.</a:t>
             </a:r>
           </a:p>
         </p:txBody>
@@ -2927,10 +3218,12 @@
           <a:p>
             <a:r>
               <a:rPr lang="en-US" baseline="0" dirty="0" smtClean="0"/>
-              <a:t>And  it should be faster.</a:t>
-            </a:r>
-          </a:p>
-          <a:p>
+              <a:t>And  it should be </a:t>
+            </a:r>
+            <a:r>
+              <a:rPr lang="en-US" baseline="0" dirty="0" smtClean="0"/>
+              <a:t>faster.</a:t>
+            </a:r>
             <a:endParaRPr lang="en-US" baseline="0" dirty="0" smtClean="0"/>
           </a:p>
           <a:p>
@@ -3067,19 +3360,63 @@
             </a:pPr>
             <a:r>
               <a:rPr lang="en-US" baseline="0" dirty="0" smtClean="0"/>
-              <a:t>If you wanted do something </a:t>
-            </a:r>
+              <a:t>If you wanted do something only slightly more complex, like strip off trailing punctuation, </a:t>
+            </a:r>
+            <a:endParaRPr lang="en-US" baseline="0" dirty="0" smtClean="0"/>
+          </a:p>
+          <a:p>
+            <a:pPr marL="0" marR="0" indent="0" algn="l" defTabSz="914400" rtl="0" eaLnBrk="1" fontAlgn="auto" latinLnBrk="0" hangingPunct="1">
+              <a:lnSpc>
+                <a:spcPct val="100000"/>
+              </a:lnSpc>
+              <a:spcBef>
+                <a:spcPts val="0"/>
+              </a:spcBef>
+              <a:spcAft>
+                <a:spcPts val="0"/>
+              </a:spcAft>
+              <a:buClrTx/>
+              <a:buSzTx/>
+              <a:buFontTx/>
+              <a:buNone/>
+              <a:tabLst/>
+              <a:defRPr/>
+            </a:pPr>
             <a:r>
               <a:rPr lang="en-US" baseline="0" dirty="0" smtClean="0"/>
-              <a:t>only slightly more complex, like </a:t>
+              <a:t>or </a:t>
             </a:r>
             <a:r>
               <a:rPr lang="en-US" baseline="0" dirty="0" smtClean="0"/>
-              <a:t>strip off trailing punctuation, or remove an initial “the” from a title or extract the title for items that are “Journals” </a:t>
-            </a:r>
+              <a:t>remove an initial “the” from a title </a:t>
+            </a:r>
+            <a:endParaRPr lang="en-US" baseline="0" dirty="0" smtClean="0"/>
+          </a:p>
+          <a:p>
+            <a:pPr marL="0" marR="0" indent="0" algn="l" defTabSz="914400" rtl="0" eaLnBrk="1" fontAlgn="auto" latinLnBrk="0" hangingPunct="1">
+              <a:lnSpc>
+                <a:spcPct val="100000"/>
+              </a:lnSpc>
+              <a:spcBef>
+                <a:spcPts val="0"/>
+              </a:spcBef>
+              <a:spcAft>
+                <a:spcPts val="0"/>
+              </a:spcAft>
+              <a:buClrTx/>
+              <a:buSzTx/>
+              <a:buFontTx/>
+              <a:buNone/>
+              <a:tabLst/>
+              <a:defRPr/>
+            </a:pPr>
             <a:r>
               <a:rPr lang="en-US" baseline="0" dirty="0" smtClean="0"/>
-              <a:t>you would need to call a custom method.</a:t>
+              <a:t>or </a:t>
+            </a:r>
+            <a:r>
+              <a:rPr lang="en-US" baseline="0" dirty="0" smtClean="0"/>
+              <a:t>extract the title for items that are “Journals” you would need to call a custom method.</a:t>
             </a:r>
           </a:p>
           <a:p>
@@ -3293,7 +3630,23 @@
           <a:p>
             <a:r>
               <a:rPr lang="en-US" dirty="0" smtClean="0"/>
-              <a:t>Using some of these new modifiers, Index specifications that needed a custom method call</a:t>
+              <a:t>Using some of these new modifiers, Index specifications that </a:t>
+            </a:r>
+            <a:r>
+              <a:rPr lang="en-US" dirty="0" smtClean="0"/>
+              <a:t>used to require</a:t>
+            </a:r>
+            <a:r>
+              <a:rPr lang="en-US" baseline="0" dirty="0" smtClean="0"/>
+              <a:t> </a:t>
+            </a:r>
+            <a:r>
+              <a:rPr lang="en-US" dirty="0" smtClean="0"/>
+              <a:t>a </a:t>
+            </a:r>
+            <a:r>
+              <a:rPr lang="en-US" dirty="0" smtClean="0"/>
+              <a:t>custom method call</a:t>
             </a:r>
           </a:p>
           <a:p>
@@ -3401,7 +3754,21 @@
             </a:r>
             <a:r>
               <a:rPr lang="en-US" baseline="0" dirty="0" smtClean="0"/>
-              <a:t> language now supports conditional qualifiers.</a:t>
+              <a:t> language now supports conditional qualifiers</a:t>
+            </a:r>
+            <a:r>
+              <a:rPr lang="en-US" baseline="0" dirty="0" smtClean="0"/>
+              <a:t>.</a:t>
+            </a:r>
+          </a:p>
+          <a:p>
+            <a:r>
+              <a:rPr lang="en-US" baseline="0" dirty="0" smtClean="0"/>
+              <a:t>Which </a:t>
+            </a:r>
+            <a:r>
+              <a:rPr lang="en-US" sz="1200" dirty="0" smtClean="0"/>
+              <a:t>allow you to include some fields/subfields only if certain conditions are true</a:t>
             </a:r>
             <a:endParaRPr lang="en-US" dirty="0" smtClean="0"/>
           </a:p>
@@ -3411,19 +3778,7 @@
           <a:p>
             <a:r>
               <a:rPr lang="en-US" dirty="0" smtClean="0"/>
-              <a:t>If </a:t>
-            </a:r>
-            <a:r>
-              <a:rPr lang="en-US" dirty="0" smtClean="0"/>
-              <a:t>you want to extract publication information from the 260abc subfields, or from the </a:t>
-            </a:r>
-            <a:r>
-              <a:rPr lang="en-US" dirty="0" smtClean="0"/>
-              <a:t>new RDA-style </a:t>
-            </a:r>
-            <a:r>
-              <a:rPr lang="en-US" dirty="0" smtClean="0"/>
-              <a:t>264abc subfields, but only wanted the 264 field if the second indicator is a "1" or a "4" then you can use the following conditional spec.</a:t>
+              <a:t>If you want to extract publication information from the 260abc subfields, or from the new RDA-style 264abc subfields, but only wanted the 264 field if the second indicator is a "1" or a "4" then you can use the following conditional spec.</a:t>
             </a:r>
           </a:p>
           <a:p>
@@ -3560,7 +3915,23 @@
           <a:p>
             <a:r>
               <a:rPr lang="en-US" baseline="0" dirty="0" smtClean="0"/>
-              <a:t>This example maps the three-letter code for a language is mapped to the full name of that language, and then appends “(dubbed in)”</a:t>
+              <a:t>This example maps the </a:t>
+            </a:r>
+            <a:r>
+              <a:rPr lang="en-US" baseline="0" dirty="0" smtClean="0"/>
+              <a:t>three-letter code </a:t>
+            </a:r>
+            <a:r>
+              <a:rPr lang="en-US" baseline="0" dirty="0" smtClean="0"/>
+              <a:t>for a language </a:t>
+            </a:r>
+            <a:r>
+              <a:rPr lang="en-US" baseline="0" dirty="0" smtClean="0"/>
+              <a:t>to the </a:t>
+            </a:r>
+            <a:r>
+              <a:rPr lang="en-US" baseline="0" dirty="0" smtClean="0"/>
+              <a:t>full name of that language, and then appends “(dubbed in)”</a:t>
             </a:r>
             <a:endParaRPr lang="en-US" dirty="0"/>
           </a:p>
@@ -3783,7 +4154,7 @@
           <a:p>
             <a:fld id="{8BE7C030-FF53-4C68-8C27-EC2636F01ABC}" type="datetimeFigureOut">
               <a:rPr lang="en-US" smtClean="0"/>
-              <a:t>10/6/2016</a:t>
+              <a:t>10/7/2016</a:t>
             </a:fld>
             <a:endParaRPr lang="en-US"/>
           </a:p>
@@ -3953,7 +4324,7 @@
           <a:p>
             <a:fld id="{8BE7C030-FF53-4C68-8C27-EC2636F01ABC}" type="datetimeFigureOut">
               <a:rPr lang="en-US" smtClean="0"/>
-              <a:t>10/6/2016</a:t>
+              <a:t>10/7/2016</a:t>
             </a:fld>
             <a:endParaRPr lang="en-US"/>
           </a:p>
@@ -4133,7 +4504,7 @@
           <a:p>
             <a:fld id="{8BE7C030-FF53-4C68-8C27-EC2636F01ABC}" type="datetimeFigureOut">
               <a:rPr lang="en-US" smtClean="0"/>
-              <a:t>10/6/2016</a:t>
+              <a:t>10/7/2016</a:t>
             </a:fld>
             <a:endParaRPr lang="en-US"/>
           </a:p>
@@ -4303,7 +4674,7 @@
           <a:p>
             <a:fld id="{8BE7C030-FF53-4C68-8C27-EC2636F01ABC}" type="datetimeFigureOut">
               <a:rPr lang="en-US" smtClean="0"/>
-              <a:t>10/6/2016</a:t>
+              <a:t>10/7/2016</a:t>
             </a:fld>
             <a:endParaRPr lang="en-US"/>
           </a:p>
@@ -4549,7 +4920,7 @@
           <a:p>
             <a:fld id="{8BE7C030-FF53-4C68-8C27-EC2636F01ABC}" type="datetimeFigureOut">
               <a:rPr lang="en-US" smtClean="0"/>
-              <a:t>10/6/2016</a:t>
+              <a:t>10/7/2016</a:t>
             </a:fld>
             <a:endParaRPr lang="en-US"/>
           </a:p>
@@ -4837,7 +5208,7 @@
           <a:p>
             <a:fld id="{8BE7C030-FF53-4C68-8C27-EC2636F01ABC}" type="datetimeFigureOut">
               <a:rPr lang="en-US" smtClean="0"/>
-              <a:t>10/6/2016</a:t>
+              <a:t>10/7/2016</a:t>
             </a:fld>
             <a:endParaRPr lang="en-US"/>
           </a:p>
@@ -5259,7 +5630,7 @@
           <a:p>
             <a:fld id="{8BE7C030-FF53-4C68-8C27-EC2636F01ABC}" type="datetimeFigureOut">
               <a:rPr lang="en-US" smtClean="0"/>
-              <a:t>10/6/2016</a:t>
+              <a:t>10/7/2016</a:t>
             </a:fld>
             <a:endParaRPr lang="en-US"/>
           </a:p>
@@ -5377,7 +5748,7 @@
           <a:p>
             <a:fld id="{8BE7C030-FF53-4C68-8C27-EC2636F01ABC}" type="datetimeFigureOut">
               <a:rPr lang="en-US" smtClean="0"/>
-              <a:t>10/6/2016</a:t>
+              <a:t>10/7/2016</a:t>
             </a:fld>
             <a:endParaRPr lang="en-US"/>
           </a:p>
@@ -5472,7 +5843,7 @@
           <a:p>
             <a:fld id="{8BE7C030-FF53-4C68-8C27-EC2636F01ABC}" type="datetimeFigureOut">
               <a:rPr lang="en-US" smtClean="0"/>
-              <a:t>10/6/2016</a:t>
+              <a:t>10/7/2016</a:t>
             </a:fld>
             <a:endParaRPr lang="en-US"/>
           </a:p>
@@ -5749,7 +6120,7 @@
           <a:p>
             <a:fld id="{8BE7C030-FF53-4C68-8C27-EC2636F01ABC}" type="datetimeFigureOut">
               <a:rPr lang="en-US" smtClean="0"/>
-              <a:t>10/6/2016</a:t>
+              <a:t>10/7/2016</a:t>
             </a:fld>
             <a:endParaRPr lang="en-US"/>
           </a:p>
@@ -6002,7 +6373,7 @@
           <a:p>
             <a:fld id="{8BE7C030-FF53-4C68-8C27-EC2636F01ABC}" type="datetimeFigureOut">
               <a:rPr lang="en-US" smtClean="0"/>
-              <a:t>10/6/2016</a:t>
+              <a:t>10/7/2016</a:t>
             </a:fld>
             <a:endParaRPr lang="en-US"/>
           </a:p>
@@ -6215,7 +6586,7 @@
           <a:p>
             <a:fld id="{8BE7C030-FF53-4C68-8C27-EC2636F01ABC}" type="datetimeFigureOut">
               <a:rPr lang="en-US" smtClean="0"/>
-              <a:t>10/6/2016</a:t>
+              <a:t>10/7/2016</a:t>
             </a:fld>
             <a:endParaRPr lang="en-US"/>
           </a:p>
@@ -6906,15 +7277,7 @@
             </a:pPr>
             <a:r>
               <a:rPr lang="en-US" sz="2800" dirty="0" smtClean="0"/>
-              <a:t>And </a:t>
-            </a:r>
-            <a:r>
-              <a:rPr lang="en-US" sz="2800" dirty="0" smtClean="0"/>
-              <a:t>multiple maps </a:t>
-            </a:r>
-            <a:r>
-              <a:rPr lang="en-US" sz="2800" dirty="0" smtClean="0"/>
-              <a:t>can appear in a single Index Spec:</a:t>
+              <a:t>And multiple maps can appear in a single Index Spec:</a:t>
             </a:r>
           </a:p>
           <a:p>
@@ -7424,11 +7787,7 @@
             </a:r>
             <a:r>
               <a:rPr lang="en-US" sz="3200" dirty="0" smtClean="0"/>
-              <a:t>“first” and “all”</a:t>
-            </a:r>
-            <a:r>
-              <a:rPr lang="en-US" sz="3200" dirty="0" smtClean="0"/>
-              <a:t> </a:t>
+              <a:t>“first” and “all” </a:t>
             </a:r>
             <a:r>
               <a:rPr lang="en-US" sz="3200" dirty="0"/>
@@ -7438,7 +7797,6 @@
               <a:rPr lang="en-US" sz="3200" dirty="0" smtClean="0"/>
               <a:t>supported</a:t>
             </a:r>
-            <a:endParaRPr lang="en-US" sz="3200" dirty="0" smtClean="0"/>
           </a:p>
           <a:p>
             <a:r>
@@ -7956,12 +8314,13 @@
             </a:r>
             <a:r>
               <a:rPr lang="en-US" sz="2400" dirty="0"/>
-              <a:t>(245c) </a:t>
+              <a:t>(245c</a:t>
             </a:r>
             <a:r>
               <a:rPr lang="en-US" sz="2400" dirty="0" smtClean="0"/>
-              <a:t>   -- still works</a:t>
-            </a:r>
+              <a:t>)</a:t>
+            </a:r>
+            <a:endParaRPr lang="en-US" sz="2400" dirty="0" smtClean="0"/>
           </a:p>
           <a:p>
             <a:r>
@@ -7970,15 +8329,7 @@
             </a:r>
             <a:r>
               <a:rPr lang="en-US" dirty="0" smtClean="0"/>
-              <a:t> </a:t>
-            </a:r>
-            <a:r>
-              <a:rPr lang="en-US" dirty="0" smtClean="0"/>
-              <a:t>Script </a:t>
-            </a:r>
-            <a:r>
-              <a:rPr lang="en-US" dirty="0" smtClean="0"/>
-              <a:t>Index Methods</a:t>
+              <a:t> Script Index Methods</a:t>
             </a:r>
           </a:p>
           <a:p>
@@ -8004,8 +8355,9 @@
             </a:r>
             <a:r>
               <a:rPr lang="en-US" sz="2400" dirty="0" smtClean="0"/>
-              <a:t>	-- still works</a:t>
-            </a:r>
+              <a:t>	</a:t>
+            </a:r>
+            <a:endParaRPr lang="en-US" sz="2400" dirty="0" smtClean="0"/>
           </a:p>
           <a:p>
             <a:r>
@@ -8048,15 +8400,16 @@
             <a:pPr marL="914400" lvl="2" indent="0">
               <a:buNone/>
             </a:pPr>
-            <a:r>
-              <a:rPr lang="en-US" dirty="0" smtClean="0"/>
-              <a:t>-- still works</a:t>
-            </a:r>
-          </a:p>
-          <a:p>
-            <a:r>
-              <a:rPr lang="en-US" dirty="0" smtClean="0"/>
-              <a:t>Local Extensions of </a:t>
+            <a:endParaRPr lang="en-US" dirty="0" smtClean="0"/>
+          </a:p>
+          <a:p>
+            <a:r>
+              <a:rPr lang="en-US" dirty="0" smtClean="0"/>
+              <a:t>Local </a:t>
+            </a:r>
+            <a:r>
+              <a:rPr lang="en-US" dirty="0" smtClean="0"/>
+              <a:t>Extensions of </a:t>
             </a:r>
             <a:r>
               <a:rPr lang="en-US" dirty="0" err="1" smtClean="0"/>
@@ -8083,9 +8436,145 @@
             </a:r>
             <a:r>
               <a:rPr lang="en-US" sz="2400" dirty="0" smtClean="0"/>
-              <a:t>")  -- still works</a:t>
+              <a:t>")</a:t>
             </a:r>
             <a:endParaRPr lang="en-US" sz="2400" dirty="0"/>
+          </a:p>
+        </p:txBody>
+      </p:sp>
+      <p:sp>
+        <p:nvSpPr>
+          <p:cNvPr id="4" name="TextBox 3"/>
+          <p:cNvSpPr txBox="1"/>
+          <p:nvPr/>
+        </p:nvSpPr>
+        <p:spPr>
+          <a:xfrm>
+            <a:off x="5782139" y="2004646"/>
+            <a:ext cx="1685461" cy="461665"/>
+          </a:xfrm>
+          <a:prstGeom prst="rect">
+            <a:avLst/>
+          </a:prstGeom>
+          <a:noFill/>
+        </p:spPr>
+        <p:txBody>
+          <a:bodyPr wrap="none" rtlCol="0">
+            <a:spAutoFit/>
+          </a:bodyPr>
+          <a:lstStyle/>
+          <a:p>
+            <a:r>
+              <a:rPr lang="en-US" sz="2400" dirty="0">
+                <a:solidFill>
+                  <a:prstClr val="black"/>
+                </a:solidFill>
+              </a:rPr>
+              <a:t>-- still works</a:t>
+            </a:r>
+            <a:endParaRPr lang="en-US" dirty="0"/>
+          </a:p>
+        </p:txBody>
+      </p:sp>
+      <p:sp>
+        <p:nvSpPr>
+          <p:cNvPr id="5" name="TextBox 4"/>
+          <p:cNvSpPr txBox="1"/>
+          <p:nvPr/>
+        </p:nvSpPr>
+        <p:spPr>
+          <a:xfrm>
+            <a:off x="6772739" y="5481935"/>
+            <a:ext cx="1685461" cy="461665"/>
+          </a:xfrm>
+          <a:prstGeom prst="rect">
+            <a:avLst/>
+          </a:prstGeom>
+          <a:noFill/>
+        </p:spPr>
+        <p:txBody>
+          <a:bodyPr wrap="none" rtlCol="0">
+            <a:spAutoFit/>
+          </a:bodyPr>
+          <a:lstStyle/>
+          <a:p>
+            <a:r>
+              <a:rPr lang="en-US" sz="2400" dirty="0">
+                <a:solidFill>
+                  <a:prstClr val="black"/>
+                </a:solidFill>
+              </a:rPr>
+              <a:t>-- still works</a:t>
+            </a:r>
+            <a:endParaRPr lang="en-US" dirty="0"/>
+          </a:p>
+        </p:txBody>
+      </p:sp>
+      <p:sp>
+        <p:nvSpPr>
+          <p:cNvPr id="6" name="TextBox 5"/>
+          <p:cNvSpPr txBox="1"/>
+          <p:nvPr/>
+        </p:nvSpPr>
+        <p:spPr>
+          <a:xfrm>
+            <a:off x="1524000" y="4456166"/>
+            <a:ext cx="1685461" cy="461665"/>
+          </a:xfrm>
+          <a:prstGeom prst="rect">
+            <a:avLst/>
+          </a:prstGeom>
+          <a:noFill/>
+        </p:spPr>
+        <p:txBody>
+          <a:bodyPr wrap="none" rtlCol="0">
+            <a:spAutoFit/>
+          </a:bodyPr>
+          <a:lstStyle/>
+          <a:p>
+            <a:r>
+              <a:rPr lang="en-US" sz="2400" dirty="0">
+                <a:solidFill>
+                  <a:prstClr val="black"/>
+                </a:solidFill>
+              </a:rPr>
+              <a:t>-- still works</a:t>
+            </a:r>
+            <a:endParaRPr lang="en-US" dirty="0"/>
+          </a:p>
+        </p:txBody>
+      </p:sp>
+      <p:sp>
+        <p:nvSpPr>
+          <p:cNvPr id="7" name="TextBox 6"/>
+          <p:cNvSpPr txBox="1"/>
+          <p:nvPr/>
+        </p:nvSpPr>
+        <p:spPr>
+          <a:xfrm>
+            <a:off x="5553539" y="3031812"/>
+            <a:ext cx="1685461" cy="461665"/>
+          </a:xfrm>
+          <a:prstGeom prst="rect">
+            <a:avLst/>
+          </a:prstGeom>
+          <a:noFill/>
+        </p:spPr>
+        <p:txBody>
+          <a:bodyPr wrap="none" rtlCol="0">
+            <a:spAutoFit/>
+          </a:bodyPr>
+          <a:lstStyle/>
+          <a:p>
+            <a:r>
+              <a:rPr lang="en-US" sz="2400" dirty="0">
+                <a:solidFill>
+                  <a:prstClr val="black"/>
+                </a:solidFill>
+              </a:rPr>
+              <a:t>-- still works</a:t>
+            </a:r>
+            <a:endParaRPr lang="en-US" dirty="0"/>
           </a:p>
         </p:txBody>
       </p:sp>
@@ -8102,9 +8591,164 @@
   <p:timing>
     <p:tnLst>
       <p:par>
-        <p:cTn id="1" dur="indefinite" restart="never" nodeType="tmRoot"/>
+        <p:cTn id="1" dur="indefinite" restart="never" nodeType="tmRoot">
+          <p:childTnLst>
+            <p:seq concurrent="1" nextAc="seek">
+              <p:cTn id="2" dur="indefinite" nodeType="mainSeq">
+                <p:childTnLst>
+                  <p:par>
+                    <p:cTn id="3" fill="hold">
+                      <p:stCondLst>
+                        <p:cond delay="indefinite"/>
+                      </p:stCondLst>
+                      <p:childTnLst>
+                        <p:par>
+                          <p:cTn id="4" fill="hold">
+                            <p:stCondLst>
+                              <p:cond delay="0"/>
+                            </p:stCondLst>
+                            <p:childTnLst>
+                              <p:par>
+                                <p:cTn id="5" presetID="1" presetClass="entr" presetSubtype="0" fill="hold" grpId="0" nodeType="clickEffect">
+                                  <p:stCondLst>
+                                    <p:cond delay="0"/>
+                                  </p:stCondLst>
+                                  <p:childTnLst>
+                                    <p:set>
+                                      <p:cBhvr>
+                                        <p:cTn id="6" dur="1" fill="hold">
+                                          <p:stCondLst>
+                                            <p:cond delay="0"/>
+                                          </p:stCondLst>
+                                        </p:cTn>
+                                        <p:tgtEl>
+                                          <p:spTgt spid="4"/>
+                                        </p:tgtEl>
+                                        <p:attrNameLst>
+                                          <p:attrName>style.visibility</p:attrName>
+                                        </p:attrNameLst>
+                                      </p:cBhvr>
+                                      <p:to>
+                                        <p:strVal val="visible"/>
+                                      </p:to>
+                                    </p:set>
+                                  </p:childTnLst>
+                                </p:cTn>
+                              </p:par>
+                              <p:par>
+                                <p:cTn id="7" presetID="1" presetClass="entr" presetSubtype="0" fill="hold" grpId="0" nodeType="withEffect">
+                                  <p:stCondLst>
+                                    <p:cond delay="500"/>
+                                  </p:stCondLst>
+                                  <p:childTnLst>
+                                    <p:set>
+                                      <p:cBhvr>
+                                        <p:cTn id="8" dur="1" fill="hold">
+                                          <p:stCondLst>
+                                            <p:cond delay="0"/>
+                                          </p:stCondLst>
+                                        </p:cTn>
+                                        <p:tgtEl>
+                                          <p:spTgt spid="7"/>
+                                        </p:tgtEl>
+                                        <p:attrNameLst>
+                                          <p:attrName>style.visibility</p:attrName>
+                                        </p:attrNameLst>
+                                      </p:cBhvr>
+                                      <p:to>
+                                        <p:strVal val="visible"/>
+                                      </p:to>
+                                    </p:set>
+                                  </p:childTnLst>
+                                </p:cTn>
+                              </p:par>
+                              <p:par>
+                                <p:cTn id="9" presetID="1" presetClass="entr" presetSubtype="0" fill="hold" grpId="0" nodeType="withEffect">
+                                  <p:stCondLst>
+                                    <p:cond delay="1000"/>
+                                  </p:stCondLst>
+                                  <p:childTnLst>
+                                    <p:set>
+                                      <p:cBhvr>
+                                        <p:cTn id="10" dur="1" fill="hold">
+                                          <p:stCondLst>
+                                            <p:cond delay="0"/>
+                                          </p:stCondLst>
+                                        </p:cTn>
+                                        <p:tgtEl>
+                                          <p:spTgt spid="6"/>
+                                        </p:tgtEl>
+                                        <p:attrNameLst>
+                                          <p:attrName>style.visibility</p:attrName>
+                                        </p:attrNameLst>
+                                      </p:cBhvr>
+                                      <p:to>
+                                        <p:strVal val="visible"/>
+                                      </p:to>
+                                    </p:set>
+                                  </p:childTnLst>
+                                </p:cTn>
+                              </p:par>
+                              <p:par>
+                                <p:cTn id="11" presetID="1" presetClass="entr" presetSubtype="0" fill="hold" grpId="0" nodeType="withEffect">
+                                  <p:stCondLst>
+                                    <p:cond delay="1500"/>
+                                  </p:stCondLst>
+                                  <p:childTnLst>
+                                    <p:set>
+                                      <p:cBhvr>
+                                        <p:cTn id="12" dur="1" fill="hold">
+                                          <p:stCondLst>
+                                            <p:cond delay="0"/>
+                                          </p:stCondLst>
+                                        </p:cTn>
+                                        <p:tgtEl>
+                                          <p:spTgt spid="5"/>
+                                        </p:tgtEl>
+                                        <p:attrNameLst>
+                                          <p:attrName>style.visibility</p:attrName>
+                                        </p:attrNameLst>
+                                      </p:cBhvr>
+                                      <p:to>
+                                        <p:strVal val="visible"/>
+                                      </p:to>
+                                    </p:set>
+                                  </p:childTnLst>
+                                </p:cTn>
+                              </p:par>
+                            </p:childTnLst>
+                          </p:cTn>
+                        </p:par>
+                      </p:childTnLst>
+                    </p:cTn>
+                  </p:par>
+                </p:childTnLst>
+              </p:cTn>
+              <p:prevCondLst>
+                <p:cond evt="onPrev" delay="0">
+                  <p:tgtEl>
+                    <p:sldTgt/>
+                  </p:tgtEl>
+                </p:cond>
+              </p:prevCondLst>
+              <p:nextCondLst>
+                <p:cond evt="onNext" delay="0">
+                  <p:tgtEl>
+                    <p:sldTgt/>
+                  </p:tgtEl>
+                </p:cond>
+              </p:nextCondLst>
+            </p:seq>
+          </p:childTnLst>
+        </p:cTn>
       </p:par>
     </p:tnLst>
+    <p:bldLst>
+      <p:bldP spid="4" grpId="0"/>
+      <p:bldP spid="5" grpId="0"/>
+      <p:bldP spid="6" grpId="0"/>
+      <p:bldP spid="7" grpId="0"/>
+    </p:bldLst>
   </p:timing>
 </p:sld>
 </file>
@@ -8689,7 +9333,12 @@
             <p:ph idx="1"/>
           </p:nvPr>
         </p:nvSpPr>
-        <p:spPr/>
+        <p:spPr>
+          <a:xfrm>
+            <a:off x="457200" y="1447800"/>
+            <a:ext cx="8229600" cy="4678363"/>
+          </a:xfrm>
+        </p:spPr>
         <p:txBody>
           <a:bodyPr>
             <a:normAutofit lnSpcReduction="10000"/>
@@ -8780,13 +9429,23 @@
             <a:pPr marL="0" indent="0">
               <a:buNone/>
             </a:pPr>
+            <a:endParaRPr lang="en-US" sz="2000" dirty="0" smtClean="0"/>
+          </a:p>
+          <a:p>
+            <a:pPr marL="0" indent="0">
+              <a:buNone/>
+            </a:pPr>
             <a:r>
               <a:rPr lang="en-US" sz="2000" dirty="0"/>
               <a:t>	</a:t>
             </a:r>
             <a:r>
               <a:rPr lang="en-US" sz="2000" dirty="0" smtClean="0"/>
-              <a:t>“0824057007 </a:t>
+              <a:t>“</a:t>
+            </a:r>
+            <a:r>
+              <a:rPr lang="en-US" sz="2000" dirty="0" smtClean="0"/>
+              <a:t>0824057007 </a:t>
             </a:r>
             <a:r>
               <a:rPr lang="en-US" sz="2000" dirty="0"/>
@@ -8974,15 +9633,33 @@
                                   </p:childTnLst>
                                 </p:cTn>
                               </p:par>
+                            </p:childTnLst>
+                          </p:cTn>
+                        </p:par>
+                      </p:childTnLst>
+                    </p:cTn>
+                  </p:par>
+                  <p:par>
+                    <p:cTn id="7" fill="hold">
+                      <p:stCondLst>
+                        <p:cond delay="indefinite"/>
+                      </p:stCondLst>
+                      <p:childTnLst>
+                        <p:par>
+                          <p:cTn id="8" fill="hold">
+                            <p:stCondLst>
+                              <p:cond delay="0"/>
+                            </p:stCondLst>
+                            <p:childTnLst>
                               <p:par>
-                                <p:cTn id="7" presetID="1" presetClass="entr" presetSubtype="0" fill="hold" grpId="0" nodeType="withEffect">
+                                <p:cTn id="9" presetID="1" presetClass="entr" presetSubtype="0" fill="hold" grpId="0" nodeType="clickEffect">
                                   <p:stCondLst>
                                     <p:cond delay="0"/>
                                   </p:stCondLst>
                                   <p:childTnLst>
                                     <p:set>
                                       <p:cBhvr>
-                                        <p:cTn id="8" dur="1" fill="hold">
+                                        <p:cTn id="10" dur="1" fill="hold">
                                           <p:stCondLst>
                                             <p:cond delay="0"/>
                                           </p:stCondLst>
@@ -8990,7 +9667,7 @@
                                         <p:tgtEl>
                                           <p:spTgt spid="3">
                                             <p:txEl>
-                                              <p:pRg st="4" end="4"/>
+                                              <p:pRg st="5" end="5"/>
                                             </p:txEl>
                                           </p:spTgt>
                                         </p:tgtEl>
@@ -9012,50 +9689,19 @@
                     </p:cTn>
                   </p:par>
                   <p:par>
-                    <p:cTn id="9" fill="hold">
+                    <p:cTn id="11" fill="hold">
                       <p:stCondLst>
                         <p:cond delay="indefinite"/>
                       </p:stCondLst>
                       <p:childTnLst>
                         <p:par>
-                          <p:cTn id="10" fill="hold">
+                          <p:cTn id="12" fill="hold">
                             <p:stCondLst>
                               <p:cond delay="0"/>
                             </p:stCondLst>
                             <p:childTnLst>
                               <p:par>
-                                <p:cTn id="11" presetID="1" presetClass="entr" presetSubtype="0" fill="hold" grpId="0" nodeType="clickEffect">
-                                  <p:stCondLst>
-                                    <p:cond delay="0"/>
-                                  </p:stCondLst>
-                                  <p:childTnLst>
-                                    <p:set>
-                                      <p:cBhvr>
-                                        <p:cTn id="12" dur="1" fill="hold">
-                                          <p:stCondLst>
-                                            <p:cond delay="0"/>
-                                          </p:stCondLst>
-                                        </p:cTn>
-                                        <p:tgtEl>
-                                          <p:spTgt spid="3">
-                                            <p:txEl>
-                                              <p:pRg st="6" end="6"/>
-                                            </p:txEl>
-                                          </p:spTgt>
-                                        </p:tgtEl>
-                                        <p:attrNameLst>
-                                          <p:attrName>style.visibility</p:attrName>
-                                        </p:attrNameLst>
-                                      </p:cBhvr>
-                                      <p:to>
-                                        <p:strVal val="visible"/>
-                                      </p:to>
-                                    </p:set>
-                                  </p:childTnLst>
-                                </p:cTn>
-                              </p:par>
-                              <p:par>
-                                <p:cTn id="13" presetID="1" presetClass="entr" presetSubtype="0" fill="hold" grpId="0" nodeType="withEffect">
+                                <p:cTn id="13" presetID="1" presetClass="entr" presetSubtype="0" fill="hold" grpId="0" nodeType="clickEffect">
                                   <p:stCondLst>
                                     <p:cond delay="0"/>
                                   </p:stCondLst>
@@ -9102,6 +9748,37 @@
                                           <p:spTgt spid="3">
                                             <p:txEl>
                                               <p:pRg st="8" end="8"/>
+                                            </p:txEl>
+                                          </p:spTgt>
+                                        </p:tgtEl>
+                                        <p:attrNameLst>
+                                          <p:attrName>style.visibility</p:attrName>
+                                        </p:attrNameLst>
+                                      </p:cBhvr>
+                                      <p:to>
+                                        <p:strVal val="visible"/>
+                                      </p:to>
+                                    </p:set>
+                                  </p:childTnLst>
+                                </p:cTn>
+                              </p:par>
+                              <p:par>
+                                <p:cTn id="17" presetID="1" presetClass="entr" presetSubtype="0" fill="hold" grpId="0" nodeType="withEffect">
+                                  <p:stCondLst>
+                                    <p:cond delay="0"/>
+                                  </p:stCondLst>
+                                  <p:childTnLst>
+                                    <p:set>
+                                      <p:cBhvr>
+                                        <p:cTn id="18" dur="1" fill="hold">
+                                          <p:stCondLst>
+                                            <p:cond delay="0"/>
+                                          </p:stCondLst>
+                                        </p:cTn>
+                                        <p:tgtEl>
+                                          <p:spTgt spid="3">
+                                            <p:txEl>
+                                              <p:pRg st="9" end="9"/>
                                             </p:txEl>
                                           </p:spTgt>
                                         </p:tgtEl>
@@ -9441,7 +10118,7 @@
       </p:par>
     </p:tnLst>
     <p:bldLst>
-      <p:bldP spid="3" grpId="0" build="p"/>
+      <p:bldP spid="3" grpId="0" uiExpand="1" build="p"/>
     </p:bldLst>
   </p:timing>
 </p:sld>
@@ -9504,7 +10181,7 @@
         <p:spPr>
           <a:xfrm>
             <a:off x="457200" y="1600200"/>
-            <a:ext cx="8305800" cy="4525963"/>
+            <a:ext cx="7848600" cy="4525963"/>
           </a:xfrm>
         </p:spPr>
         <p:txBody>
@@ -9586,12 +10263,24 @@
               <a:t> 5.5, </a:t>
             </a:r>
             <a:r>
+              <a:rPr lang="en-US" dirty="0"/>
+              <a:t> </a:t>
+            </a:r>
+            <a:r>
+              <a:rPr lang="en-US" dirty="0" smtClean="0"/>
+              <a:t>   </a:t>
+            </a:r>
+            <a:r>
               <a:rPr lang="en-US" dirty="0" err="1" smtClean="0"/>
               <a:t>Solr</a:t>
             </a:r>
             <a:r>
               <a:rPr lang="en-US" dirty="0" smtClean="0"/>
-              <a:t> 6.0</a:t>
+              <a:t> </a:t>
+            </a:r>
+            <a:r>
+              <a:rPr lang="en-US" dirty="0" smtClean="0"/>
+              <a:t>6.0</a:t>
             </a:r>
             <a:endParaRPr lang="en-US" dirty="0"/>
           </a:p>
@@ -10222,11 +10911,7 @@
           <a:p>
             <a:r>
               <a:rPr lang="en-US" dirty="0" smtClean="0"/>
-              <a:t>Most recent full re-index at University of Virginia with previous </a:t>
-            </a:r>
-            <a:r>
-              <a:rPr lang="en-US" dirty="0" smtClean="0"/>
-              <a:t>version of </a:t>
+              <a:t>Most recent full re-index at University of Virginia with previous version of </a:t>
             </a:r>
             <a:r>
               <a:rPr lang="en-US" dirty="0" err="1" smtClean="0"/>
@@ -10235,33 +10920,34 @@
             <a:endParaRPr lang="en-US" dirty="0" smtClean="0"/>
           </a:p>
           <a:p>
-            <a:pPr marL="0" indent="0">
-              <a:buNone/>
+            <a:pPr lvl="1">
+              <a:buFont typeface="Arial" pitchFamily="34" charset="0"/>
+              <a:buChar char="•"/>
             </a:pPr>
             <a:r>
               <a:rPr lang="en-US" dirty="0" smtClean="0"/>
-              <a:t>	4,847,392  records  in 17 </a:t>
-            </a:r>
-            <a:r>
-              <a:rPr lang="en-US" dirty="0" err="1" smtClean="0"/>
-              <a:t>hrs</a:t>
-            </a:r>
-            <a:r>
-              <a:rPr lang="en-US" dirty="0" smtClean="0"/>
-              <a:t> 36 minutes</a:t>
-            </a:r>
-          </a:p>
-          <a:p>
-            <a:pPr marL="0" indent="0">
+              <a:t>4,847,392 records in </a:t>
+            </a:r>
+            <a:r>
+              <a:rPr lang="en-US" dirty="0" smtClean="0"/>
+              <a:t>17 </a:t>
+            </a:r>
+            <a:r>
+              <a:rPr lang="en-US" dirty="0" smtClean="0"/>
+              <a:t>hours 36 minutes</a:t>
+            </a:r>
+          </a:p>
+          <a:p>
+            <a:pPr marL="457200" lvl="1" indent="0">
               <a:buNone/>
             </a:pPr>
             <a:r>
-              <a:rPr lang="en-US" dirty="0"/>
-              <a:t>	</a:t>
-            </a:r>
-            <a:r>
-              <a:rPr lang="en-US" dirty="0" smtClean="0"/>
-              <a:t>		76.6 recs/second</a:t>
+              <a:rPr lang="en-US" dirty="0" smtClean="0"/>
+              <a:t>   (7</a:t>
+            </a:r>
+            <a:r>
+              <a:rPr lang="en-US" dirty="0" smtClean="0"/>
+              <a:t>6.6 recs/second)</a:t>
             </a:r>
             <a:endParaRPr lang="en-US" dirty="0"/>
           </a:p>
@@ -10277,51 +10963,50 @@
             <a:endParaRPr lang="en-US" dirty="0" smtClean="0"/>
           </a:p>
           <a:p>
-            <a:pPr marL="0" indent="0">
-              <a:buNone/>
+            <a:pPr lvl="1">
+              <a:buFont typeface="Arial" pitchFamily="34" charset="0"/>
+              <a:buChar char="•"/>
             </a:pPr>
             <a:r>
-              <a:rPr lang="en-US" dirty="0"/>
-              <a:t>	</a:t>
-            </a:r>
-            <a:r>
-              <a:rPr lang="en-US" dirty="0" smtClean="0"/>
-              <a:t>5,141,401  records in   1 </a:t>
-            </a:r>
-            <a:r>
-              <a:rPr lang="en-US" dirty="0" err="1" smtClean="0"/>
-              <a:t>hr</a:t>
-            </a:r>
-            <a:r>
-              <a:rPr lang="en-US" dirty="0" smtClean="0"/>
-              <a:t> 3 minutes</a:t>
+              <a:rPr lang="en-US" dirty="0" smtClean="0"/>
+              <a:t>5,141,401 records in 1 hour </a:t>
+            </a:r>
+            <a:r>
+              <a:rPr lang="en-US" dirty="0" smtClean="0"/>
+              <a:t>3 </a:t>
+            </a:r>
+            <a:r>
+              <a:rPr lang="en-US" dirty="0" smtClean="0"/>
+              <a:t>minutes</a:t>
             </a:r>
             <a:endParaRPr lang="en-US" dirty="0"/>
           </a:p>
           <a:p>
-            <a:pPr marL="0" indent="0">
+            <a:pPr marL="457200" lvl="1" indent="0">
               <a:buNone/>
             </a:pPr>
             <a:r>
-              <a:rPr lang="en-US" dirty="0"/>
-              <a:t>		</a:t>
-            </a:r>
-            <a:r>
-              <a:rPr lang="en-US" dirty="0" smtClean="0"/>
-              <a:t>        1,360 recs/second</a:t>
-            </a:r>
-          </a:p>
-          <a:p>
-            <a:pPr marL="0" indent="0">
+              <a:rPr lang="en-US" dirty="0" smtClean="0"/>
+              <a:t>   (1,360 recs/second)</a:t>
+            </a:r>
+          </a:p>
+          <a:p>
+            <a:pPr marL="457200" lvl="1" indent="0">
               <a:buNone/>
             </a:pPr>
-            <a:r>
-              <a:rPr lang="en-US" dirty="0" smtClean="0"/>
-              <a:t>	or  17.7 times </a:t>
-            </a:r>
-            <a:r>
-              <a:rPr lang="en-US" dirty="0" smtClean="0"/>
-              <a:t>faster</a:t>
+            <a:endParaRPr lang="en-US" dirty="0" smtClean="0"/>
+          </a:p>
+          <a:p>
+            <a:pPr marL="0" indent="0" algn="ctr">
+              <a:buNone/>
+            </a:pPr>
+            <a:r>
+              <a:rPr lang="en-US" dirty="0" smtClean="0"/>
+              <a:t>17.7 </a:t>
+            </a:r>
+            <a:r>
+              <a:rPr lang="en-US" dirty="0" smtClean="0"/>
+              <a:t>times faster</a:t>
             </a:r>
             <a:endParaRPr lang="en-US" dirty="0"/>
           </a:p>
@@ -10631,7 +11316,7 @@
                                         <p:tgtEl>
                                           <p:spTgt spid="3">
                                             <p:txEl>
-                                              <p:pRg st="6" end="6"/>
+                                              <p:pRg st="7" end="7"/>
                                             </p:txEl>
                                           </p:spTgt>
                                         </p:tgtEl>
@@ -11852,7 +12537,7 @@
             <a:endParaRPr lang="en-US" dirty="0" smtClean="0"/>
           </a:p>
           <a:p>
-            <a:endParaRPr lang="en-US" dirty="0" smtClean="0"/>
+            <a:endParaRPr lang="en-US" sz="1800" dirty="0" smtClean="0"/>
           </a:p>
           <a:p>
             <a:r>
@@ -11882,12 +12567,16 @@
             <a:endParaRPr lang="en-US" dirty="0" smtClean="0"/>
           </a:p>
           <a:p>
-            <a:endParaRPr lang="en-US" dirty="0"/>
-          </a:p>
-          <a:p>
-            <a:r>
-              <a:rPr lang="en-US" dirty="0" smtClean="0"/>
-              <a:t>Simple Index Specification, plus translation maps, plus Custom Index Methods</a:t>
+            <a:endParaRPr lang="en-US" sz="1800" dirty="0"/>
+          </a:p>
+          <a:p>
+            <a:r>
+              <a:rPr lang="en-US" dirty="0" smtClean="0"/>
+              <a:t>Designed with Simple </a:t>
+            </a:r>
+            <a:r>
+              <a:rPr lang="en-US" dirty="0" smtClean="0"/>
+              <a:t>Index Specification, plus translation maps, plus Custom Index Methods</a:t>
             </a:r>
             <a:endParaRPr lang="en-US" dirty="0"/>
           </a:p>
@@ -12041,8 +12730,28 @@
               <a:t>008 </a:t>
             </a:r>
             <a:r>
+              <a:rPr lang="en-US" sz="2000" dirty="0" smtClean="0"/>
+              <a:t>831222q19801983dcu</a:t>
+            </a:r>
+            <a:r>
+              <a:rPr lang="en-US" sz="2000" dirty="0" smtClean="0">
+                <a:solidFill>
+                  <a:schemeClr val="bg1"/>
+                </a:solidFill>
+              </a:rPr>
+              <a:t>034 </a:t>
+            </a:r>
+            <a:r>
+              <a:rPr lang="en-US" sz="2000" dirty="0" err="1" smtClean="0"/>
+              <a:t>ue</a:t>
+            </a:r>
+            <a:r>
+              <a:rPr lang="en-US" sz="2000" dirty="0" smtClean="0"/>
+              <a:t>     </a:t>
+            </a:r>
+            <a:r>
               <a:rPr lang="en-US" sz="2000" dirty="0"/>
-              <a:t>831222q19801983dcu034ue     f   0vleng </a:t>
+              <a:t>f   0vleng </a:t>
             </a:r>
             <a:r>
               <a:rPr lang="en-US" sz="2000" dirty="0" smtClean="0"/>
@@ -12128,8 +12837,8 @@
         </p:nvSpPr>
         <p:spPr>
           <a:xfrm>
-            <a:off x="4255477" y="1592813"/>
-            <a:ext cx="4344459" cy="400110"/>
+            <a:off x="4388932" y="1592813"/>
+            <a:ext cx="4450267" cy="400110"/>
           </a:xfrm>
           <a:prstGeom prst="rect">
             <a:avLst/>
@@ -12137,7 +12846,7 @@
           <a:noFill/>
         </p:spPr>
         <p:txBody>
-          <a:bodyPr wrap="none" rtlCol="0">
+          <a:bodyPr wrap="square" rtlCol="0">
             <a:spAutoFit/>
           </a:bodyPr>
           <a:lstStyle/>
@@ -12236,6 +12945,36 @@
                 <a:prstClr val="black"/>
               </a:solidFill>
             </a:endParaRPr>
+          </a:p>
+        </p:txBody>
+      </p:sp>
+      <p:sp>
+        <p:nvSpPr>
+          <p:cNvPr id="8" name="TextBox 7"/>
+          <p:cNvSpPr txBox="1"/>
+          <p:nvPr/>
+        </p:nvSpPr>
+        <p:spPr>
+          <a:xfrm>
+            <a:off x="3311769" y="4202723"/>
+            <a:ext cx="400836" cy="323165"/>
+          </a:xfrm>
+          <a:prstGeom prst="rect">
+            <a:avLst/>
+          </a:prstGeom>
+          <a:noFill/>
+        </p:spPr>
+        <p:txBody>
+          <a:bodyPr wrap="none" lIns="0" tIns="0" rIns="0" bIns="0" rtlCol="0">
+            <a:noAutofit/>
+          </a:bodyPr>
+          <a:lstStyle/>
+          <a:p>
+            <a:r>
+              <a:rPr lang="en-US" sz="2000" dirty="0" smtClean="0"/>
+              <a:t>034</a:t>
+            </a:r>
+            <a:endParaRPr lang="en-US" dirty="0"/>
           </a:p>
         </p:txBody>
       </p:sp>
@@ -12842,6 +13581,33 @@
                                   </p:childTnLst>
                                 </p:cTn>
                               </p:par>
+                              <p:par>
+                                <p:cTn id="51" presetID="1" presetClass="entr" presetSubtype="0" fill="hold" grpId="0" nodeType="withEffect">
+                                  <p:stCondLst>
+                                    <p:cond delay="0"/>
+                                  </p:stCondLst>
+                                  <p:childTnLst>
+                                    <p:set>
+                                      <p:cBhvr>
+                                        <p:cTn id="52" dur="1" fill="hold">
+                                          <p:stCondLst>
+                                            <p:cond delay="0"/>
+                                          </p:stCondLst>
+                                        </p:cTn>
+                                        <p:tgtEl>
+                                          <p:spTgt spid="8"/>
+                                        </p:tgtEl>
+                                        <p:attrNameLst>
+                                          <p:attrName>style.visibility</p:attrName>
+                                        </p:attrNameLst>
+                                      </p:cBhvr>
+                                      <p:to>
+                                        <p:strVal val="visible"/>
+                                      </p:to>
+                                    </p:set>
+                                  </p:childTnLst>
+                                </p:cTn>
+                              </p:par>
                             </p:childTnLst>
                           </p:cTn>
                         </p:par>
@@ -12849,26 +13615,146 @@
                     </p:cTn>
                   </p:par>
                   <p:par>
-                    <p:cTn id="51" fill="hold">
+                    <p:cTn id="53" fill="hold">
                       <p:stCondLst>
                         <p:cond delay="indefinite"/>
                       </p:stCondLst>
                       <p:childTnLst>
                         <p:par>
-                          <p:cTn id="52" fill="hold">
+                          <p:cTn id="54" fill="hold">
                             <p:stCondLst>
                               <p:cond delay="0"/>
                             </p:stCondLst>
                             <p:childTnLst>
                               <p:par>
-                                <p:cTn id="53" presetID="1" presetClass="entr" presetSubtype="0" fill="hold" nodeType="clickEffect">
+                                <p:cTn id="55" presetID="1" presetClass="emph" presetSubtype="2" fill="hold" nodeType="clickEffect">
+                                  <p:stCondLst>
+                                    <p:cond delay="0"/>
+                                  </p:stCondLst>
+                                  <p:childTnLst>
+                                    <p:animClr clrSpc="rgb" dir="cw">
+                                      <p:cBhvr>
+                                        <p:cTn id="56" dur="100" fill="hold"/>
+                                        <p:tgtEl>
+                                          <p:spTgt spid="8"/>
+                                        </p:tgtEl>
+                                        <p:attrNameLst>
+                                          <p:attrName>fillcolor</p:attrName>
+                                        </p:attrNameLst>
+                                      </p:cBhvr>
+                                      <p:to>
+                                        <a:srgbClr val="FFFF00"/>
+                                      </p:to>
+                                    </p:animClr>
+                                    <p:set>
+                                      <p:cBhvr>
+                                        <p:cTn id="57" dur="100" fill="hold"/>
+                                        <p:tgtEl>
+                                          <p:spTgt spid="8"/>
+                                        </p:tgtEl>
+                                        <p:attrNameLst>
+                                          <p:attrName>fill.type</p:attrName>
+                                        </p:attrNameLst>
+                                      </p:cBhvr>
+                                      <p:to>
+                                        <p:strVal val="solid"/>
+                                      </p:to>
+                                    </p:set>
+                                    <p:set>
+                                      <p:cBhvr>
+                                        <p:cTn id="58" dur="100" fill="hold"/>
+                                        <p:tgtEl>
+                                          <p:spTgt spid="8"/>
+                                        </p:tgtEl>
+                                        <p:attrNameLst>
+                                          <p:attrName>fill.on</p:attrName>
+                                        </p:attrNameLst>
+                                      </p:cBhvr>
+                                      <p:to>
+                                        <p:strVal val="true"/>
+                                      </p:to>
+                                    </p:set>
+                                  </p:childTnLst>
+                                </p:cTn>
+                              </p:par>
+                            </p:childTnLst>
+                          </p:cTn>
+                        </p:par>
+                      </p:childTnLst>
+                    </p:cTn>
+                  </p:par>
+                  <p:par>
+                    <p:cTn id="59" fill="hold">
+                      <p:stCondLst>
+                        <p:cond delay="indefinite"/>
+                      </p:stCondLst>
+                      <p:childTnLst>
+                        <p:par>
+                          <p:cTn id="60" fill="hold">
+                            <p:stCondLst>
+                              <p:cond delay="0"/>
+                            </p:stCondLst>
+                            <p:childTnLst>
+                              <p:par>
+                                <p:cTn id="61" presetID="1" presetClass="emph" presetSubtype="2" fill="hold" nodeType="clickEffect">
+                                  <p:stCondLst>
+                                    <p:cond delay="0"/>
+                                  </p:stCondLst>
+                                  <p:childTnLst>
+                                    <p:animClr clrSpc="rgb" dir="cw">
+                                      <p:cBhvr>
+                                        <p:cTn id="62" dur="100" fill="hold"/>
+                                        <p:tgtEl>
+                                          <p:spTgt spid="8"/>
+                                        </p:tgtEl>
+                                        <p:attrNameLst>
+                                          <p:attrName>fillcolor</p:attrName>
+                                        </p:attrNameLst>
+                                      </p:cBhvr>
+                                      <p:to>
+                                        <a:srgbClr val="FFFFFF"/>
+                                      </p:to>
+                                    </p:animClr>
+                                    <p:set>
+                                      <p:cBhvr>
+                                        <p:cTn id="63" dur="100" fill="hold"/>
+                                        <p:tgtEl>
+                                          <p:spTgt spid="8"/>
+                                        </p:tgtEl>
+                                        <p:attrNameLst>
+                                          <p:attrName>fill.type</p:attrName>
+                                        </p:attrNameLst>
+                                      </p:cBhvr>
+                                      <p:to>
+                                        <p:strVal val="solid"/>
+                                      </p:to>
+                                    </p:set>
+                                    <p:set>
+                                      <p:cBhvr>
+                                        <p:cTn id="64" dur="100" fill="hold"/>
+                                        <p:tgtEl>
+                                          <p:spTgt spid="8"/>
+                                        </p:tgtEl>
+                                        <p:attrNameLst>
+                                          <p:attrName>fill.on</p:attrName>
+                                        </p:attrNameLst>
+                                      </p:cBhvr>
+                                      <p:to>
+                                        <p:strVal val="true"/>
+                                      </p:to>
+                                    </p:set>
+                                  </p:childTnLst>
+                                </p:cTn>
+                              </p:par>
+                              <p:par>
+                                <p:cTn id="65" presetID="1" presetClass="entr" presetSubtype="0" fill="hold" nodeType="withEffect">
                                   <p:stCondLst>
                                     <p:cond delay="0"/>
                                   </p:stCondLst>
                                   <p:childTnLst>
                                     <p:set>
                                       <p:cBhvr>
-                                        <p:cTn id="54" dur="1" fill="hold">
+                                        <p:cTn id="66" dur="1" fill="hold">
                                           <p:stCondLst>
                                             <p:cond delay="0"/>
                                           </p:stCondLst>
@@ -12892,14 +13778,14 @@
                                 </p:cTn>
                               </p:par>
                               <p:par>
-                                <p:cTn id="55" presetID="1" presetClass="entr" presetSubtype="0" fill="hold" nodeType="withEffect">
+                                <p:cTn id="67" presetID="1" presetClass="entr" presetSubtype="0" fill="hold" nodeType="withEffect">
                                   <p:stCondLst>
                                     <p:cond delay="0"/>
                                   </p:stCondLst>
                                   <p:childTnLst>
                                     <p:set>
                                       <p:cBhvr>
-                                        <p:cTn id="56" dur="1" fill="hold">
+                                        <p:cTn id="68" dur="1" fill="hold">
                                           <p:stCondLst>
                                             <p:cond delay="0"/>
                                           </p:stCondLst>
@@ -12949,6 +13835,9 @@
         </p:cTn>
       </p:par>
     </p:tnLst>
+    <p:bldLst>
+      <p:bldP spid="8" grpId="0"/>
+    </p:bldLst>
   </p:timing>
 </p:sld>
 </file>
@@ -14160,7 +15049,177 @@
   <p:timing>
     <p:tnLst>
       <p:par>
-        <p:cTn id="1" dur="indefinite" restart="never" nodeType="tmRoot"/>
+        <p:cTn id="1" dur="indefinite" restart="never" nodeType="tmRoot">
+          <p:childTnLst>
+            <p:seq concurrent="1" nextAc="seek">
+              <p:cTn id="2" dur="indefinite" nodeType="mainSeq">
+                <p:childTnLst>
+                  <p:par>
+                    <p:cTn id="3" fill="hold">
+                      <p:stCondLst>
+                        <p:cond delay="indefinite"/>
+                      </p:stCondLst>
+                      <p:childTnLst>
+                        <p:par>
+                          <p:cTn id="4" fill="hold">
+                            <p:stCondLst>
+                              <p:cond delay="0"/>
+                            </p:stCondLst>
+                            <p:childTnLst>
+                              <p:par>
+                                <p:cTn id="5" presetID="1" presetClass="entr" presetSubtype="0" fill="hold" nodeType="clickEffect">
+                                  <p:stCondLst>
+                                    <p:cond delay="0"/>
+                                  </p:stCondLst>
+                                  <p:childTnLst>
+                                    <p:set>
+                                      <p:cBhvr>
+                                        <p:cTn id="6" dur="1" fill="hold">
+                                          <p:stCondLst>
+                                            <p:cond delay="0"/>
+                                          </p:stCondLst>
+                                        </p:cTn>
+                                        <p:tgtEl>
+                                          <p:spTgt spid="3">
+                                            <p:txEl>
+                                              <p:pRg st="6" end="6"/>
+                                            </p:txEl>
+                                          </p:spTgt>
+                                        </p:tgtEl>
+                                        <p:attrNameLst>
+                                          <p:attrName>style.visibility</p:attrName>
+                                        </p:attrNameLst>
+                                      </p:cBhvr>
+                                      <p:to>
+                                        <p:strVal val="visible"/>
+                                      </p:to>
+                                    </p:set>
+                                  </p:childTnLst>
+                                </p:cTn>
+                              </p:par>
+                            </p:childTnLst>
+                          </p:cTn>
+                        </p:par>
+                      </p:childTnLst>
+                    </p:cTn>
+                  </p:par>
+                  <p:par>
+                    <p:cTn id="7" fill="hold">
+                      <p:stCondLst>
+                        <p:cond delay="indefinite"/>
+                      </p:stCondLst>
+                      <p:childTnLst>
+                        <p:par>
+                          <p:cTn id="8" fill="hold">
+                            <p:stCondLst>
+                              <p:cond delay="0"/>
+                            </p:stCondLst>
+                            <p:childTnLst>
+                              <p:par>
+                                <p:cTn id="9" presetID="1" presetClass="entr" presetSubtype="0" fill="hold" nodeType="clickEffect">
+                                  <p:stCondLst>
+                                    <p:cond delay="0"/>
+                                  </p:stCondLst>
+                                  <p:childTnLst>
+                                    <p:set>
+                                      <p:cBhvr>
+                                        <p:cTn id="10" dur="1" fill="hold">
+                                          <p:stCondLst>
+                                            <p:cond delay="0"/>
+                                          </p:stCondLst>
+                                        </p:cTn>
+                                        <p:tgtEl>
+                                          <p:spTgt spid="3">
+                                            <p:txEl>
+                                              <p:pRg st="7" end="7"/>
+                                            </p:txEl>
+                                          </p:spTgt>
+                                        </p:tgtEl>
+                                        <p:attrNameLst>
+                                          <p:attrName>style.visibility</p:attrName>
+                                        </p:attrNameLst>
+                                      </p:cBhvr>
+                                      <p:to>
+                                        <p:strVal val="visible"/>
+                                      </p:to>
+                                    </p:set>
+                                  </p:childTnLst>
+                                </p:cTn>
+                              </p:par>
+                            </p:childTnLst>
+                          </p:cTn>
+                        </p:par>
+                      </p:childTnLst>
+                    </p:cTn>
+                  </p:par>
+                  <p:par>
+                    <p:cTn id="11" fill="hold">
+                      <p:stCondLst>
+                        <p:cond delay="indefinite"/>
+                      </p:stCondLst>
+                      <p:childTnLst>
+                        <p:par>
+                          <p:cTn id="12" fill="hold">
+                            <p:stCondLst>
+                              <p:cond delay="0"/>
+                            </p:stCondLst>
+                            <p:childTnLst>
+                              <p:par>
+                                <p:cTn id="13" presetID="1" presetClass="entr" presetSubtype="0" fill="hold" nodeType="clickEffect">
+                                  <p:stCondLst>
+                                    <p:cond delay="0"/>
+                                  </p:stCondLst>
+                                  <p:childTnLst>
+                                    <p:set>
+                                      <p:cBhvr>
+                                        <p:cTn id="14" dur="1" fill="hold">
+                                          <p:stCondLst>
+                                            <p:cond delay="0"/>
+                                          </p:stCondLst>
+                                        </p:cTn>
+                                        <p:tgtEl>
+                                          <p:spTgt spid="3">
+                                            <p:txEl>
+                                              <p:pRg st="8" end="8"/>
+                                            </p:txEl>
+                                          </p:spTgt>
+                                        </p:tgtEl>
+                                        <p:attrNameLst>
+                                          <p:attrName>style.visibility</p:attrName>
+                                        </p:attrNameLst>
+                                      </p:cBhvr>
+                                      <p:to>
+                                        <p:strVal val="visible"/>
+                                      </p:to>
+                                    </p:set>
+                                  </p:childTnLst>
+                                </p:cTn>
+                              </p:par>
+                            </p:childTnLst>
+                          </p:cTn>
+                        </p:par>
+                      </p:childTnLst>
+                    </p:cTn>
+                  </p:par>
+                </p:childTnLst>
+              </p:cTn>
+              <p:prevCondLst>
+                <p:cond evt="onPrev" delay="0">
+                  <p:tgtEl>
+                    <p:sldTgt/>
+                  </p:tgtEl>
+                </p:cond>
+              </p:prevCondLst>
+              <p:nextCondLst>
+                <p:cond evt="onNext" delay="0">
+                  <p:tgtEl>
+                    <p:sldTgt/>
+                  </p:tgtEl>
+                </p:cond>
+              </p:nextCondLst>
+            </p:seq>
+          </p:childTnLst>
+        </p:cTn>
       </p:par>
     </p:tnLst>
   </p:timing>
@@ -15160,23 +16219,7 @@
                   <a:prstClr val="black"/>
                 </a:solidFill>
               </a:rPr>
-              <a:t>So these Index Specs that needed </a:t>
-            </a:r>
-            <a:r>
-              <a:rPr lang="en-US" dirty="0" smtClean="0">
-                <a:solidFill>
-                  <a:prstClr val="black"/>
-                </a:solidFill>
-              </a:rPr>
-              <a:t>custom </a:t>
-            </a:r>
-            <a:r>
-              <a:rPr lang="en-US" dirty="0" smtClean="0">
-                <a:solidFill>
-                  <a:prstClr val="black"/>
-                </a:solidFill>
-              </a:rPr>
-              <a:t>method calls:</a:t>
+              <a:t>So these Index Specs that needed custom method calls:</a:t>
             </a:r>
           </a:p>
           <a:p>
@@ -15720,9 +16763,6 @@
           </a:bodyPr>
           <a:lstStyle/>
           <a:p>
-            <a:pPr marL="0" indent="0">
-              <a:buNone/>
-            </a:pPr>
             <a:r>
               <a:rPr lang="en-US" sz="2800" dirty="0" smtClean="0"/>
               <a:t>Allow you to include </a:t>
@@ -16066,7 +17106,7 @@
         <a:sysClr val="windowText" lastClr="000000"/>
       </a:dk1>
       <a:lt1>
-        <a:sysClr val="window" lastClr="E6E6D8"/>
+        <a:sysClr val="window" lastClr="FFFFFF"/>
       </a:lt1>
       <a:dk2>
         <a:srgbClr val="1F497D"/>
@@ -16351,7 +17391,7 @@
         <a:sysClr val="windowText" lastClr="000000"/>
       </a:dk1>
       <a:lt1>
-        <a:sysClr val="window" lastClr="E6E6D8"/>
+        <a:sysClr val="window" lastClr="FFFFFF"/>
       </a:lt1>
       <a:dk2>
         <a:srgbClr val="1F497D"/>

</xml_diff>